<commit_message>
update docs hoan chinh
</commit_message>
<xml_diff>
--- a/docs/110121023_TrangThanhHieu_Da21TTB.pptx
+++ b/docs/110121023_TrangThanhHieu_Da21TTB.pptx
@@ -415,7 +415,7 @@
           <a:p>
             <a:fld id="{527F3E95-C2CC-4D53-B1D9-905DFA5F436A}" type="datetimeFigureOut">
               <a:rPr lang="en-US" smtClean="0"/>
-              <a:t>8/29/2025</a:t>
+              <a:t>9/3/2025</a:t>
             </a:fld>
             <a:endParaRPr lang="en-US"/>
           </a:p>
@@ -1058,6 +1058,72 @@
 </file>
 
 <file path=ppt/notesSlides/notesSlide10.xml><?xml version="1.0" encoding="utf-8"?>
+<p:notes xmlns:a="http://schemas.openxmlformats.org/drawingml/2006/main" xmlns:r="http://schemas.openxmlformats.org/officeDocument/2006/relationships" xmlns:p="http://schemas.openxmlformats.org/presentationml/2006/main">
+  <p:cSld>
+    <p:spTree>
+      <p:nvGrpSpPr>
+        <p:cNvPr id="1" name=""/>
+        <p:cNvGrpSpPr/>
+        <p:nvPr/>
+      </p:nvGrpSpPr>
+      <p:grpSpPr>
+        <a:xfrm>
+          <a:off x="0" y="0"/>
+          <a:ext cx="0" cy="0"/>
+          <a:chOff x="0" y="0"/>
+          <a:chExt cx="0" cy="0"/>
+        </a:xfrm>
+      </p:grpSpPr>
+      <p:sp>
+        <p:nvSpPr>
+          <p:cNvPr id="2" name="Slide Image Placeholder 1"/>
+          <p:cNvSpPr>
+            <a:spLocks noGrp="1" noRot="1" noChangeAspect="1"/>
+          </p:cNvSpPr>
+          <p:nvPr>
+            <p:ph type="sldImg"/>
+          </p:nvPr>
+        </p:nvSpPr>
+        <p:spPr>
+          <a:xfrm>
+            <a:off x="381000" y="685800"/>
+            <a:ext cx="6096000" cy="3429000"/>
+          </a:xfrm>
+        </p:spPr>
+      </p:sp>
+      <p:sp>
+        <p:nvSpPr>
+          <p:cNvPr id="3" name="Notes Placeholder 2"/>
+          <p:cNvSpPr>
+            <a:spLocks noGrp="1"/>
+          </p:cNvSpPr>
+          <p:nvPr>
+            <p:ph type="body" idx="1"/>
+          </p:nvPr>
+        </p:nvSpPr>
+        <p:spPr/>
+        <p:txBody>
+          <a:bodyPr/>
+          <a:lstStyle/>
+          <a:p>
+            <a:endParaRPr lang="en-US" dirty="0"/>
+          </a:p>
+        </p:txBody>
+      </p:sp>
+    </p:spTree>
+    <p:extLst>
+      <p:ext uri="{BB962C8B-B14F-4D97-AF65-F5344CB8AC3E}">
+        <p14:creationId xmlns:p14="http://schemas.microsoft.com/office/powerpoint/2010/main" val="2675560921"/>
+      </p:ext>
+    </p:extLst>
+  </p:cSld>
+  <p:clrMapOvr>
+    <a:masterClrMapping/>
+  </p:clrMapOvr>
+</p:notes>
+</file>
+
+<file path=ppt/notesSlides/notesSlide11.xml><?xml version="1.0" encoding="utf-8"?>
 <p:notes xmlns:a="http://schemas.openxmlformats.org/drawingml/2006/main" xmlns:r="http://schemas.openxmlformats.org/officeDocument/2006/relationships" xmlns:p="http://schemas.openxmlformats.org/presentationml/2006/main" showMasterSp="0" showMasterPhAnim="0">
   <p:cSld>
     <p:spTree>
@@ -1736,12 +1802,7 @@
             <p:ph type="sldImg"/>
           </p:nvPr>
         </p:nvSpPr>
-        <p:spPr>
-          <a:xfrm>
-            <a:off x="381000" y="685800"/>
-            <a:ext cx="6096000" cy="3429000"/>
-          </a:xfrm>
-        </p:spPr>
+        <p:spPr/>
       </p:sp>
       <p:sp>
         <p:nvSpPr>
@@ -1765,7 +1826,7 @@
     </p:spTree>
     <p:extLst>
       <p:ext uri="{BB962C8B-B14F-4D97-AF65-F5344CB8AC3E}">
-        <p14:creationId xmlns:p14="http://schemas.microsoft.com/office/powerpoint/2010/main" val="1286225092"/>
+        <p14:creationId xmlns:p14="http://schemas.microsoft.com/office/powerpoint/2010/main" val="149959979"/>
       </p:ext>
     </p:extLst>
   </p:cSld>
@@ -1831,7 +1892,7 @@
     </p:spTree>
     <p:extLst>
       <p:ext uri="{BB962C8B-B14F-4D97-AF65-F5344CB8AC3E}">
-        <p14:creationId xmlns:p14="http://schemas.microsoft.com/office/powerpoint/2010/main" val="2675560921"/>
+        <p14:creationId xmlns:p14="http://schemas.microsoft.com/office/powerpoint/2010/main" val="1286225092"/>
       </p:ext>
     </p:extLst>
   </p:cSld>
@@ -24496,7 +24557,7 @@
               <a:rPr lang="vi-VN" sz="1600" dirty="0">
                 <a:latin typeface="+mn-lt"/>
               </a:rPr>
-              <a:t>  để chọn đường ngắn nhất</a:t>
+              <a:t> để chọn đường ngắn nhất</a:t>
             </a:r>
           </a:p>
           <a:p>
@@ -25840,7 +25901,7 @@
         <p:spPr>
           <a:xfrm>
             <a:off x="772024" y="1710855"/>
-            <a:ext cx="5971676" cy="3139321"/>
+            <a:ext cx="6471176" cy="3139321"/>
           </a:xfrm>
           <a:prstGeom prst="rect">
             <a:avLst/>
@@ -25872,13 +25933,15 @@
             </a:endParaRPr>
           </a:p>
           <a:p>
-            <a:pPr>
+            <a:pPr marL="285750" indent="-285750">
               <a:spcBef>
                 <a:spcPts val="600"/>
               </a:spcBef>
               <a:spcAft>
                 <a:spcPts val="600"/>
               </a:spcAft>
+              <a:buFont typeface="Arial" panose="020B0604020202020204" pitchFamily="34" charset="0"/>
+              <a:buChar char="•"/>
             </a:pPr>
             <a:r>
               <a:rPr lang="vi-VN" sz="1600" dirty="0">
@@ -25891,13 +25954,15 @@
             </a:endParaRPr>
           </a:p>
           <a:p>
-            <a:pPr>
+            <a:pPr marL="285750" indent="-285750">
               <a:spcBef>
                 <a:spcPts val="600"/>
               </a:spcBef>
               <a:spcAft>
                 <a:spcPts val="600"/>
               </a:spcAft>
+              <a:buFont typeface="Arial" panose="020B0604020202020204" pitchFamily="34" charset="0"/>
+              <a:buChar char="•"/>
             </a:pPr>
             <a:r>
               <a:rPr lang="vi-VN" sz="1600" dirty="0">
@@ -25934,13 +25999,15 @@
             </a:endParaRPr>
           </a:p>
           <a:p>
-            <a:pPr>
+            <a:pPr marL="285750" indent="-285750">
               <a:spcBef>
                 <a:spcPts val="600"/>
               </a:spcBef>
               <a:spcAft>
                 <a:spcPts val="600"/>
               </a:spcAft>
+              <a:buFont typeface="Arial" panose="020B0604020202020204" pitchFamily="34" charset="0"/>
+              <a:buChar char="•"/>
             </a:pPr>
             <a:r>
               <a:rPr lang="en-US" sz="1600" dirty="0">
@@ -25981,13 +26048,15 @@
             </a:endParaRPr>
           </a:p>
           <a:p>
-            <a:pPr>
+            <a:pPr marL="285750" indent="-285750">
               <a:spcBef>
                 <a:spcPts val="600"/>
               </a:spcBef>
               <a:spcAft>
                 <a:spcPts val="600"/>
               </a:spcAft>
+              <a:buFont typeface="Arial" panose="020B0604020202020204" pitchFamily="34" charset="0"/>
+              <a:buChar char="•"/>
             </a:pPr>
             <a:r>
               <a:rPr lang="vi-VN" sz="1600" dirty="0">
@@ -26000,13 +26069,15 @@
             </a:endParaRPr>
           </a:p>
           <a:p>
-            <a:pPr>
+            <a:pPr marL="285750" indent="-285750">
               <a:spcBef>
                 <a:spcPts val="600"/>
               </a:spcBef>
               <a:spcAft>
                 <a:spcPts val="600"/>
               </a:spcAft>
+              <a:buFont typeface="Arial" panose="020B0604020202020204" pitchFamily="34" charset="0"/>
+              <a:buChar char="•"/>
             </a:pPr>
             <a:r>
               <a:rPr lang="vi-VN" sz="1600" dirty="0">
@@ -26019,13 +26090,15 @@
             </a:endParaRPr>
           </a:p>
           <a:p>
-            <a:pPr>
+            <a:pPr marL="285750" indent="-285750">
               <a:spcBef>
                 <a:spcPts val="600"/>
               </a:spcBef>
               <a:spcAft>
                 <a:spcPts val="600"/>
               </a:spcAft>
+              <a:buFont typeface="Arial" panose="020B0604020202020204" pitchFamily="34" charset="0"/>
+              <a:buChar char="•"/>
             </a:pPr>
             <a:r>
               <a:rPr lang="vi-VN" sz="1600" dirty="0">
@@ -28410,8 +28483,8 @@
         </p:nvSpPr>
         <p:spPr>
           <a:xfrm>
-            <a:off x="892016" y="1001546"/>
-            <a:ext cx="4914424" cy="3539430"/>
+            <a:off x="815816" y="936746"/>
+            <a:ext cx="4903984" cy="3939540"/>
           </a:xfrm>
           <a:prstGeom prst="rect">
             <a:avLst/>
@@ -28485,19 +28558,204 @@
               <a:rPr lang="vi-VN" sz="1600" dirty="0">
                 <a:latin typeface="+mn-lt"/>
               </a:rPr>
-              <a:t>Thành phần </a:t>
-            </a:r>
+              <a:t>Thành phần chính:</a:t>
+            </a:r>
+            <a:endParaRPr lang="en-US" sz="1600" dirty="0">
+              <a:latin typeface="+mn-lt"/>
+            </a:endParaRPr>
+          </a:p>
+          <a:p>
+            <a:pPr>
+              <a:spcBef>
+                <a:spcPts val="600"/>
+              </a:spcBef>
+              <a:spcAft>
+                <a:spcPts val="600"/>
+              </a:spcAft>
+            </a:pPr>
             <a:r>
               <a:rPr lang="vi-VN" sz="1600" dirty="0" err="1">
                 <a:latin typeface="+mn-lt"/>
               </a:rPr>
-              <a:t>chính:Router</a:t>
+              <a:t>Router</a:t>
             </a:r>
             <a:r>
               <a:rPr lang="vi-VN" sz="1600" dirty="0">
                 <a:latin typeface="+mn-lt"/>
               </a:rPr>
               <a:t>:</a:t>
+            </a:r>
+            <a:r>
+              <a:rPr lang="en-US" sz="1600" dirty="0">
+                <a:latin typeface="+mn-lt"/>
+              </a:rPr>
+              <a:t> </a:t>
+            </a:r>
+            <a:r>
+              <a:rPr lang="vi-VN" sz="1600" dirty="0">
+                <a:latin typeface="+mn-lt"/>
+              </a:rPr>
+              <a:t>R1 (</a:t>
+            </a:r>
+            <a:r>
+              <a:rPr lang="vi-VN" sz="1600" dirty="0" err="1">
+                <a:latin typeface="+mn-lt"/>
+              </a:rPr>
+              <a:t>Area</a:t>
+            </a:r>
+            <a:r>
+              <a:rPr lang="vi-VN" sz="1600" dirty="0">
+                <a:latin typeface="+mn-lt"/>
+              </a:rPr>
+              <a:t> 0</a:t>
+            </a:r>
+            <a:r>
+              <a:rPr lang="en-US" sz="1600" dirty="0">
+                <a:latin typeface="+mn-lt"/>
+              </a:rPr>
+              <a:t>-</a:t>
+            </a:r>
+            <a:r>
+              <a:rPr lang="vi-VN" sz="1600" dirty="0" err="1">
+                <a:latin typeface="+mn-lt"/>
+              </a:rPr>
+              <a:t>Backbone</a:t>
+            </a:r>
+            <a:r>
+              <a:rPr lang="vi-VN" sz="1600" dirty="0">
+                <a:latin typeface="+mn-lt"/>
+              </a:rPr>
+              <a:t>), R2 (</a:t>
+            </a:r>
+            <a:r>
+              <a:rPr lang="vi-VN" sz="1600" dirty="0" err="1">
+                <a:latin typeface="+mn-lt"/>
+              </a:rPr>
+              <a:t>Area</a:t>
+            </a:r>
+            <a:r>
+              <a:rPr lang="vi-VN" sz="1600" dirty="0">
+                <a:latin typeface="+mn-lt"/>
+              </a:rPr>
+              <a:t> 1), </a:t>
+            </a:r>
+            <a:endParaRPr lang="en-US" sz="1600" dirty="0">
+              <a:latin typeface="+mn-lt"/>
+            </a:endParaRPr>
+          </a:p>
+          <a:p>
+            <a:pPr>
+              <a:spcBef>
+                <a:spcPts val="600"/>
+              </a:spcBef>
+              <a:spcAft>
+                <a:spcPts val="600"/>
+              </a:spcAft>
+            </a:pPr>
+            <a:r>
+              <a:rPr lang="vi-VN" sz="1600" dirty="0">
+                <a:latin typeface="+mn-lt"/>
+              </a:rPr>
+              <a:t>R3 (</a:t>
+            </a:r>
+            <a:r>
+              <a:rPr lang="vi-VN" sz="1600" dirty="0" err="1">
+                <a:latin typeface="+mn-lt"/>
+              </a:rPr>
+              <a:t>Area</a:t>
+            </a:r>
+            <a:r>
+              <a:rPr lang="vi-VN" sz="1600" dirty="0">
+                <a:latin typeface="+mn-lt"/>
+              </a:rPr>
+              <a:t> 2)</a:t>
+            </a:r>
+            <a:endParaRPr lang="en-US" sz="1600" dirty="0">
+              <a:latin typeface="+mn-lt"/>
+            </a:endParaRPr>
+          </a:p>
+          <a:p>
+            <a:pPr>
+              <a:spcBef>
+                <a:spcPts val="600"/>
+              </a:spcBef>
+              <a:spcAft>
+                <a:spcPts val="600"/>
+              </a:spcAft>
+            </a:pPr>
+            <a:r>
+              <a:rPr lang="vi-VN" sz="1600" dirty="0" err="1">
+                <a:latin typeface="+mn-lt"/>
+              </a:rPr>
+              <a:t>Switch</a:t>
+            </a:r>
+            <a:r>
+              <a:rPr lang="vi-VN" sz="1600" dirty="0">
+                <a:latin typeface="+mn-lt"/>
+              </a:rPr>
+              <a:t>: S1 (</a:t>
+            </a:r>
+            <a:r>
+              <a:rPr lang="vi-VN" sz="1600" dirty="0" err="1">
+                <a:latin typeface="+mn-lt"/>
+              </a:rPr>
+              <a:t>Layer</a:t>
+            </a:r>
+            <a:r>
+              <a:rPr lang="vi-VN" sz="1600" dirty="0">
+                <a:latin typeface="+mn-lt"/>
+              </a:rPr>
+              <a:t> 3), S2, S3 (</a:t>
+            </a:r>
+            <a:r>
+              <a:rPr lang="vi-VN" sz="1600" dirty="0" err="1">
+                <a:latin typeface="+mn-lt"/>
+              </a:rPr>
+              <a:t>Layer</a:t>
+            </a:r>
+            <a:r>
+              <a:rPr lang="vi-VN" sz="1600" dirty="0">
+                <a:latin typeface="+mn-lt"/>
+              </a:rPr>
+              <a:t> 2)</a:t>
+            </a:r>
+            <a:endParaRPr lang="en-US" sz="1600" dirty="0">
+              <a:latin typeface="+mn-lt"/>
+            </a:endParaRPr>
+          </a:p>
+          <a:p>
+            <a:pPr>
+              <a:spcBef>
+                <a:spcPts val="600"/>
+              </a:spcBef>
+              <a:spcAft>
+                <a:spcPts val="600"/>
+              </a:spcAft>
+            </a:pPr>
+            <a:r>
+              <a:rPr lang="vi-VN" sz="1600" dirty="0">
+                <a:latin typeface="+mn-lt"/>
+              </a:rPr>
+              <a:t>PC: chia thành các VLAN</a:t>
+            </a:r>
+            <a:endParaRPr lang="en-US" sz="1600" dirty="0">
+              <a:latin typeface="+mn-lt"/>
+            </a:endParaRPr>
+          </a:p>
+          <a:p>
+            <a:pPr>
+              <a:spcBef>
+                <a:spcPts val="600"/>
+              </a:spcBef>
+              <a:spcAft>
+                <a:spcPts val="600"/>
+              </a:spcAft>
+            </a:pPr>
+            <a:r>
+              <a:rPr lang="vi-VN" sz="1600" dirty="0">
+                <a:latin typeface="+mn-lt"/>
+              </a:rPr>
+              <a:t>Các kết nối chính:</a:t>
             </a:r>
             <a:endParaRPr lang="en-US" sz="1600" dirty="0">
               <a:latin typeface="+mn-lt"/>
@@ -28518,61 +28776,13 @@
               <a:rPr lang="vi-VN" sz="1600" dirty="0">
                 <a:latin typeface="+mn-lt"/>
               </a:rPr>
-              <a:t>R1 (</a:t>
+              <a:t>OSPF </a:t>
             </a:r>
             <a:r>
               <a:rPr lang="vi-VN" sz="1600" dirty="0" err="1">
                 <a:latin typeface="+mn-lt"/>
               </a:rPr>
-              <a:t>Area</a:t>
-            </a:r>
-            <a:r>
-              <a:rPr lang="vi-VN" sz="1600" dirty="0">
-                <a:latin typeface="+mn-lt"/>
-              </a:rPr>
-              <a:t> 0</a:t>
-            </a:r>
-            <a:r>
-              <a:rPr lang="en-US" sz="1600" dirty="0">
-                <a:latin typeface="+mn-lt"/>
-              </a:rPr>
-              <a:t>-</a:t>
-            </a:r>
-            <a:r>
-              <a:rPr lang="vi-VN" sz="1600" dirty="0" err="1">
-                <a:latin typeface="+mn-lt"/>
-              </a:rPr>
-              <a:t>Backbone</a:t>
-            </a:r>
-            <a:r>
-              <a:rPr lang="vi-VN" sz="1600" dirty="0">
-                <a:latin typeface="+mn-lt"/>
-              </a:rPr>
-              <a:t>), R2 (</a:t>
-            </a:r>
-            <a:r>
-              <a:rPr lang="vi-VN" sz="1600" dirty="0" err="1">
-                <a:latin typeface="+mn-lt"/>
-              </a:rPr>
-              <a:t>Area</a:t>
-            </a:r>
-            <a:r>
-              <a:rPr lang="vi-VN" sz="1600" dirty="0">
-                <a:latin typeface="+mn-lt"/>
-              </a:rPr>
-              <a:t> 1), R3 (</a:t>
-            </a:r>
-            <a:r>
-              <a:rPr lang="vi-VN" sz="1600" dirty="0" err="1">
-                <a:latin typeface="+mn-lt"/>
-              </a:rPr>
-              <a:t>Area</a:t>
-            </a:r>
-            <a:r>
-              <a:rPr lang="vi-VN" sz="1600" dirty="0">
-                <a:latin typeface="+mn-lt"/>
-              </a:rPr>
-              <a:t> 2)</a:t>
+              <a:t>multi-area</a:t>
             </a:r>
             <a:endParaRPr lang="en-US" sz="1600" dirty="0">
               <a:latin typeface="+mn-lt"/>
@@ -28593,37 +28803,13 @@
               <a:rPr lang="vi-VN" sz="1600" dirty="0" err="1">
                 <a:latin typeface="+mn-lt"/>
               </a:rPr>
-              <a:t>Switch</a:t>
+              <a:t>EtherChannel</a:t>
             </a:r>
             <a:r>
               <a:rPr lang="vi-VN" sz="1600" dirty="0">
                 <a:latin typeface="+mn-lt"/>
               </a:rPr>
-              <a:t>: S1 (</a:t>
-            </a:r>
-            <a:r>
-              <a:rPr lang="vi-VN" sz="1600" dirty="0" err="1">
-                <a:latin typeface="+mn-lt"/>
-              </a:rPr>
-              <a:t>Layer</a:t>
-            </a:r>
-            <a:r>
-              <a:rPr lang="vi-VN" sz="1600" dirty="0">
-                <a:latin typeface="+mn-lt"/>
-              </a:rPr>
-              <a:t> 3), S2, S3 (</a:t>
-            </a:r>
-            <a:r>
-              <a:rPr lang="vi-VN" sz="1600" dirty="0" err="1">
-                <a:latin typeface="+mn-lt"/>
-              </a:rPr>
-              <a:t>Layer</a:t>
-            </a:r>
-            <a:r>
-              <a:rPr lang="vi-VN" sz="1600" dirty="0">
-                <a:latin typeface="+mn-lt"/>
-              </a:rPr>
-              <a:t> 2)</a:t>
+              <a:t> + STP giữa S1–S2–S3</a:t>
             </a:r>
             <a:endParaRPr lang="en-US" sz="1600" dirty="0">
               <a:latin typeface="+mn-lt"/>
@@ -28644,79 +28830,6 @@
               <a:rPr lang="vi-VN" sz="1600" dirty="0">
                 <a:latin typeface="+mn-lt"/>
               </a:rPr>
-              <a:t>PC: chia thành các VLAN</a:t>
-            </a:r>
-            <a:endParaRPr lang="en-US" sz="1600" dirty="0">
-              <a:latin typeface="+mn-lt"/>
-            </a:endParaRPr>
-          </a:p>
-          <a:p>
-            <a:pPr>
-              <a:spcBef>
-                <a:spcPts val="600"/>
-              </a:spcBef>
-              <a:spcAft>
-                <a:spcPts val="600"/>
-              </a:spcAft>
-            </a:pPr>
-            <a:r>
-              <a:rPr lang="vi-VN" sz="1600" dirty="0">
-                <a:latin typeface="+mn-lt"/>
-              </a:rPr>
-              <a:t>Các kết nối chính:</a:t>
-            </a:r>
-            <a:endParaRPr lang="en-US" sz="1600" dirty="0">
-              <a:latin typeface="+mn-lt"/>
-            </a:endParaRPr>
-          </a:p>
-          <a:p>
-            <a:pPr marL="285750" indent="-285750">
-              <a:spcBef>
-                <a:spcPts val="600"/>
-              </a:spcBef>
-              <a:spcAft>
-                <a:spcPts val="600"/>
-              </a:spcAft>
-              <a:buFont typeface="Wingdings" panose="05000000000000000000" pitchFamily="2" charset="2"/>
-              <a:buChar char="§"/>
-            </a:pPr>
-            <a:r>
-              <a:rPr lang="vi-VN" sz="1600" dirty="0">
-                <a:latin typeface="+mn-lt"/>
-              </a:rPr>
-              <a:t>OSPF </a:t>
-            </a:r>
-            <a:r>
-              <a:rPr lang="vi-VN" sz="1600" dirty="0" err="1">
-                <a:latin typeface="+mn-lt"/>
-              </a:rPr>
-              <a:t>multi-area</a:t>
-            </a:r>
-            <a:r>
-              <a:rPr lang="vi-VN" sz="1600" dirty="0">
-                <a:latin typeface="+mn-lt"/>
-              </a:rPr>
-              <a:t>.</a:t>
-            </a:r>
-            <a:endParaRPr lang="en-US" sz="1600" dirty="0">
-              <a:latin typeface="+mn-lt"/>
-            </a:endParaRPr>
-          </a:p>
-          <a:p>
-            <a:pPr marL="285750" indent="-285750">
-              <a:spcBef>
-                <a:spcPts val="600"/>
-              </a:spcBef>
-              <a:spcAft>
-                <a:spcPts val="600"/>
-              </a:spcAft>
-              <a:buFont typeface="Wingdings" panose="05000000000000000000" pitchFamily="2" charset="2"/>
-              <a:buChar char="§"/>
-            </a:pPr>
-            <a:r>
-              <a:rPr lang="vi-VN" sz="1600" dirty="0">
-                <a:latin typeface="+mn-lt"/>
-              </a:rPr>
               <a:t>GRE </a:t>
             </a:r>
             <a:r>
@@ -28770,33 +28883,6 @@
                 <a:latin typeface="+mn-lt"/>
               </a:rPr>
               <a:t>R2 ↔ R3</a:t>
-            </a:r>
-            <a:endParaRPr lang="en-US" sz="1600" dirty="0">
-              <a:latin typeface="+mn-lt"/>
-            </a:endParaRPr>
-          </a:p>
-          <a:p>
-            <a:pPr marL="285750" indent="-285750">
-              <a:spcBef>
-                <a:spcPts val="600"/>
-              </a:spcBef>
-              <a:spcAft>
-                <a:spcPts val="600"/>
-              </a:spcAft>
-              <a:buFont typeface="Wingdings" panose="05000000000000000000" pitchFamily="2" charset="2"/>
-              <a:buChar char="§"/>
-            </a:pPr>
-            <a:r>
-              <a:rPr lang="vi-VN" sz="1600" dirty="0" err="1">
-                <a:latin typeface="+mn-lt"/>
-              </a:rPr>
-              <a:t>EtherChannel</a:t>
-            </a:r>
-            <a:r>
-              <a:rPr lang="vi-VN" sz="1600" dirty="0">
-                <a:latin typeface="+mn-lt"/>
-              </a:rPr>
-              <a:t> + STP giữa S1–S2–S3</a:t>
             </a:r>
             <a:endParaRPr lang="en-US" sz="1600" dirty="0">
               <a:latin typeface="+mn-lt"/>
@@ -34071,7 +34157,7 @@
         <p:spPr>
           <a:xfrm>
             <a:off x="2152988" y="1386810"/>
-            <a:ext cx="5025052" cy="1184940"/>
+            <a:ext cx="5025052" cy="1477328"/>
           </a:xfrm>
           <a:prstGeom prst="rect">
             <a:avLst/>
@@ -34117,6 +34203,14 @@
                 <a:spcPts val="600"/>
               </a:spcBef>
             </a:pPr>
+            <a:endParaRPr lang="en-US" i="1" dirty="0"/>
+          </a:p>
+          <a:p>
+            <a:pPr>
+              <a:spcBef>
+                <a:spcPts val="600"/>
+              </a:spcBef>
+            </a:pPr>
             <a:r>
               <a:rPr lang="en-US" i="1" dirty="0"/>
               <a:t>S2(config)# interface range fa0/1 - 2</a:t>
@@ -34149,7 +34243,7 @@
         </p:nvSpPr>
         <p:spPr>
           <a:xfrm>
-            <a:off x="1848188" y="2677180"/>
+            <a:off x="1848188" y="3003219"/>
             <a:ext cx="3192780" cy="307777"/>
           </a:xfrm>
           <a:prstGeom prst="rect">
@@ -34196,7 +34290,7 @@
         </p:nvSpPr>
         <p:spPr>
           <a:xfrm>
-            <a:off x="2152988" y="3090387"/>
+            <a:off x="2197593" y="3367386"/>
             <a:ext cx="5025052" cy="892552"/>
           </a:xfrm>
           <a:prstGeom prst="rect">
@@ -34272,7 +34366,7 @@
         </p:nvSpPr>
         <p:spPr>
           <a:xfrm>
-            <a:off x="1848188" y="4091074"/>
+            <a:off x="1848188" y="4470216"/>
             <a:ext cx="4815840" cy="307777"/>
           </a:xfrm>
           <a:prstGeom prst="rect">
@@ -36487,7 +36581,7 @@
             </a:pPr>
             <a:r>
               <a:rPr lang="pt-BR" dirty="0"/>
-              <a:t>Ping từ R2 → R3 qua Tunnel thành công</a:t>
+              <a:t>Ping từ R1 → R2 qua Tunnel thành công</a:t>
             </a:r>
             <a:endParaRPr lang="en-US" dirty="0"/>
           </a:p>
@@ -37177,7 +37271,7 @@
             </a:pPr>
             <a:r>
               <a:rPr lang="en-US" i="1" dirty="0"/>
-              <a:t>C:\&gt;ping PC1 (VLAN10) → PC3 (VLAN30)</a:t>
+              <a:t>C:\&gt;ping PC1 (VLAN10) → PC4 (VLAN30)</a:t>
             </a:r>
           </a:p>
           <a:p>
@@ -42682,7 +42776,7 @@
         </p:nvGrpSpPr>
         <p:grpSpPr>
           <a:xfrm>
-            <a:off x="6443995" y="405408"/>
+            <a:off x="6715490" y="465262"/>
             <a:ext cx="3508772" cy="4332684"/>
             <a:chOff x="-5" y="813197"/>
             <a:chExt cx="3508772" cy="4332684"/>
@@ -44312,8 +44406,8 @@
         </p:nvSpPr>
         <p:spPr>
           <a:xfrm>
-            <a:off x="1206335" y="1691084"/>
-            <a:ext cx="4601741" cy="1255272"/>
+            <a:off x="226428" y="1491448"/>
+            <a:ext cx="6681943" cy="1255272"/>
           </a:xfrm>
           <a:prstGeom prst="rect">
             <a:avLst/>
@@ -44325,25 +44419,146 @@
           </a:bodyPr>
           <a:lstStyle/>
           <a:p>
-            <a:pPr lvl="0"/>
-            <a:r>
-              <a:rPr lang="en-US" sz="4000" b="1" dirty="0">
+            <a:pPr lvl="0">
+              <a:spcBef>
+                <a:spcPts val="600"/>
+              </a:spcBef>
+              <a:spcAft>
+                <a:spcPts val="600"/>
+              </a:spcAft>
+            </a:pPr>
+            <a:r>
+              <a:rPr lang="en-US" sz="3600" b="1" dirty="0" err="1">
                 <a:latin typeface="+mj-lt"/>
               </a:rPr>
-              <a:t>Thank You</a:t>
+              <a:t>Cảm</a:t>
+            </a:r>
+            <a:r>
+              <a:rPr lang="en-US" sz="3600" b="1" dirty="0">
+                <a:latin typeface="+mj-lt"/>
+              </a:rPr>
+              <a:t> </a:t>
+            </a:r>
+            <a:r>
+              <a:rPr lang="en-US" sz="3600" b="1" dirty="0" err="1">
+                <a:latin typeface="+mj-lt"/>
+              </a:rPr>
+              <a:t>ơn</a:t>
+            </a:r>
+            <a:r>
+              <a:rPr lang="en-US" sz="3600" b="1" dirty="0">
+                <a:latin typeface="+mj-lt"/>
+              </a:rPr>
+              <a:t> </a:t>
+            </a:r>
+            <a:r>
+              <a:rPr lang="en-US" sz="3600" b="1" dirty="0" err="1">
+                <a:latin typeface="+mj-lt"/>
+              </a:rPr>
+              <a:t>Thầy</a:t>
+            </a:r>
+            <a:r>
+              <a:rPr lang="en-US" sz="3600" b="1" dirty="0">
+                <a:latin typeface="+mj-lt"/>
+              </a:rPr>
+              <a:t>/</a:t>
+            </a:r>
+            <a:r>
+              <a:rPr lang="en-US" sz="3600" b="1" dirty="0" err="1">
+                <a:latin typeface="+mj-lt"/>
+              </a:rPr>
+              <a:t>Cô</a:t>
+            </a:r>
+            <a:r>
+              <a:rPr lang="en-US" sz="3600" b="1" dirty="0">
+                <a:latin typeface="+mj-lt"/>
+              </a:rPr>
+              <a:t> </a:t>
             </a:r>
             <a:br>
-              <a:rPr lang="en-US" sz="4000" b="1" dirty="0">
+              <a:rPr lang="en-US" sz="3600" b="1" dirty="0">
                 <a:latin typeface="+mj-lt"/>
               </a:rPr>
             </a:br>
             <a:r>
-              <a:rPr lang="en-US" sz="4000" b="1" dirty="0">
+              <a:rPr lang="en-US" sz="3600" b="1" dirty="0">
                 <a:latin typeface="+mj-lt"/>
               </a:rPr>
-              <a:t> 	for Listening!</a:t>
-            </a:r>
-            <a:endParaRPr sz="4000" b="1" dirty="0">
+              <a:t>	</a:t>
+            </a:r>
+            <a:r>
+              <a:rPr lang="en-US" sz="3600" b="1" dirty="0" err="1">
+                <a:latin typeface="+mj-lt"/>
+              </a:rPr>
+              <a:t>và</a:t>
+            </a:r>
+            <a:r>
+              <a:rPr lang="en-US" sz="3600" b="1" dirty="0">
+                <a:latin typeface="+mj-lt"/>
+              </a:rPr>
+              <a:t> </a:t>
+            </a:r>
+            <a:r>
+              <a:rPr lang="en-US" sz="3600" b="1" dirty="0" err="1">
+                <a:latin typeface="+mj-lt"/>
+              </a:rPr>
+              <a:t>các</a:t>
+            </a:r>
+            <a:r>
+              <a:rPr lang="en-US" sz="3600" b="1" dirty="0">
+                <a:latin typeface="+mj-lt"/>
+              </a:rPr>
+              <a:t> </a:t>
+            </a:r>
+            <a:r>
+              <a:rPr lang="en-US" sz="3600" b="1" dirty="0" err="1">
+                <a:latin typeface="+mj-lt"/>
+              </a:rPr>
+              <a:t>bạn</a:t>
+            </a:r>
+            <a:r>
+              <a:rPr lang="en-US" sz="3600" b="1" dirty="0">
+                <a:latin typeface="+mj-lt"/>
+              </a:rPr>
+              <a:t> </a:t>
+            </a:r>
+            <a:r>
+              <a:rPr lang="en-US" sz="3600" b="1" dirty="0" err="1">
+                <a:latin typeface="+mj-lt"/>
+              </a:rPr>
+              <a:t>đã</a:t>
+            </a:r>
+            <a:r>
+              <a:rPr lang="en-US" sz="3600" b="1" dirty="0">
+                <a:latin typeface="+mj-lt"/>
+              </a:rPr>
+              <a:t> </a:t>
+            </a:r>
+            <a:r>
+              <a:rPr lang="en-US" sz="3600" b="1" dirty="0" err="1">
+                <a:latin typeface="+mj-lt"/>
+              </a:rPr>
+              <a:t>lắng</a:t>
+            </a:r>
+            <a:r>
+              <a:rPr lang="en-US" sz="3600" b="1" dirty="0">
+                <a:latin typeface="+mj-lt"/>
+              </a:rPr>
+              <a:t> </a:t>
+            </a:r>
+            <a:r>
+              <a:rPr lang="en-US" sz="3600" b="1" dirty="0" err="1">
+                <a:latin typeface="+mj-lt"/>
+              </a:rPr>
+              <a:t>nghe</a:t>
+            </a:r>
+            <a:r>
+              <a:rPr lang="en-US" sz="3600" b="1" dirty="0">
+                <a:latin typeface="+mj-lt"/>
+              </a:rPr>
+              <a:t>!</a:t>
+            </a:r>
+            <a:endParaRPr sz="3600" b="1" dirty="0">
               <a:latin typeface="+mj-lt"/>
             </a:endParaRPr>
           </a:p>
@@ -47841,7 +48056,7 @@
                 </a:solidFill>
                 <a:latin typeface="Arial" panose="020B0604020202020204" pitchFamily="34" charset="0"/>
               </a:rPr>
-              <a:t> VLAN, OSPF, GRE, STP, Load Balancing</a:t>
+              <a:t> VLAN, OSPF, STP, GRE Tunnel, Load Balancing</a:t>
             </a:r>
             <a:endParaRPr lang="en-US" dirty="0"/>
           </a:p>

</xml_diff>